<commit_message>
Controller Life Cycle Demo
</commit_message>
<xml_diff>
--- a/dev-docs/guide/Training.pptx
+++ b/dev-docs/guide/Training.pptx
@@ -4349,30 +4349,6 @@
           </a:p>
         </p:txBody>
       </p:sp>
-      <p:pic>
-        <p:nvPicPr>
-          <p:cNvPr id="2" name="Picture 1"/>
-          <p:cNvPicPr>
-            <a:picLocks noChangeAspect="1"/>
-          </p:cNvPicPr>
-          <p:nvPr/>
-        </p:nvPicPr>
-        <p:blipFill>
-          <a:blip r:embed="rId2"/>
-          <a:stretch>
-            <a:fillRect/>
-          </a:stretch>
-        </p:blipFill>
-        <p:spPr>
-          <a:xfrm>
-            <a:off x="1691680" y="1655676"/>
-            <a:ext cx="5660138" cy="505029"/>
-          </a:xfrm>
-          <a:prstGeom prst="rect">
-            <a:avLst/>
-          </a:prstGeom>
-        </p:spPr>
-      </p:pic>
       <p:sp>
         <p:nvSpPr>
           <p:cNvPr id="4" name="Right Brace 3"/>
@@ -4381,8 +4357,8 @@
         </p:nvSpPr>
         <p:spPr>
           <a:xfrm rot="5400000">
-            <a:off x="3532166" y="289041"/>
-            <a:ext cx="648072" cy="4329043"/>
+            <a:off x="3275956" y="-1049709"/>
+            <a:ext cx="648072" cy="6285584"/>
           </a:xfrm>
           <a:prstGeom prst="rightBrace">
             <a:avLst>
@@ -4416,21 +4392,22 @@
       </p:sp>
       <p:pic>
         <p:nvPicPr>
-          <p:cNvPr id="5" name="Picture 4"/>
+          <p:cNvPr id="10" name="Picture 9"/>
           <p:cNvPicPr>
             <a:picLocks noChangeAspect="1"/>
           </p:cNvPicPr>
           <p:nvPr/>
         </p:nvPicPr>
-        <p:blipFill rotWithShape="1">
-          <a:blip r:embed="rId3"/>
-          <a:srcRect t="2684"/>
-          <a:stretch/>
+        <p:blipFill>
+          <a:blip r:embed="rId2"/>
+          <a:stretch>
+            <a:fillRect/>
+          </a:stretch>
         </p:blipFill>
         <p:spPr>
           <a:xfrm>
-            <a:off x="107504" y="3933056"/>
-            <a:ext cx="8154030" cy="2083483"/>
+            <a:off x="35496" y="3789040"/>
+            <a:ext cx="8912368" cy="2259124"/>
           </a:xfrm>
           <a:prstGeom prst="rect">
             <a:avLst/>
@@ -4455,7 +4432,7 @@
         </p:nvSpPr>
         <p:spPr>
           <a:xfrm>
-            <a:off x="1862686" y="2887275"/>
+            <a:off x="1619672" y="2492896"/>
             <a:ext cx="3384376" cy="707886"/>
           </a:xfrm>
           <a:prstGeom prst="rect">
@@ -4488,8 +4465,8 @@
         </p:nvCxnSpPr>
         <p:spPr>
           <a:xfrm flipH="1">
-            <a:off x="2123728" y="3595161"/>
-            <a:ext cx="1431146" cy="337895"/>
+            <a:off x="1547664" y="3200782"/>
+            <a:ext cx="1764196" cy="588258"/>
           </a:xfrm>
           <a:prstGeom prst="straightConnector1">
             <a:avLst/>
@@ -4513,6 +4490,30 @@
           </a:fontRef>
         </p:style>
       </p:cxnSp>
+      <p:pic>
+        <p:nvPicPr>
+          <p:cNvPr id="13" name="Picture 12"/>
+          <p:cNvPicPr>
+            <a:picLocks noChangeAspect="1"/>
+          </p:cNvPicPr>
+          <p:nvPr/>
+        </p:nvPicPr>
+        <p:blipFill>
+          <a:blip r:embed="rId3"/>
+          <a:stretch>
+            <a:fillRect/>
+          </a:stretch>
+        </p:blipFill>
+        <p:spPr>
+          <a:xfrm>
+            <a:off x="457200" y="1402482"/>
+            <a:ext cx="7497044" cy="514350"/>
+          </a:xfrm>
+          <a:prstGeom prst="rect">
+            <a:avLst/>
+          </a:prstGeom>
+        </p:spPr>
+      </p:pic>
     </p:spTree>
     <p:extLst>
       <p:ext uri="{BB962C8B-B14F-4D97-AF65-F5344CB8AC3E}">
@@ -4557,7 +4558,7 @@
                                           </p:stCondLst>
                                         </p:cTn>
                                         <p:tgtEl>
-                                          <p:spTgt spid="2"/>
+                                          <p:spTgt spid="13"/>
                                         </p:tgtEl>
                                         <p:attrNameLst>
                                           <p:attrName>style.visibility</p:attrName>
@@ -4701,7 +4702,7 @@
                                           </p:stCondLst>
                                         </p:cTn>
                                         <p:tgtEl>
-                                          <p:spTgt spid="5"/>
+                                          <p:spTgt spid="10"/>
                                         </p:tgtEl>
                                         <p:attrNameLst>
                                           <p:attrName>style.visibility</p:attrName>
@@ -4791,125 +4792,6 @@
       </p:sp>
       <p:sp>
         <p:nvSpPr>
-          <p:cNvPr id="3" name="Content Placeholder 2"/>
-          <p:cNvSpPr>
-            <a:spLocks noGrp="1"/>
-          </p:cNvSpPr>
-          <p:nvPr>
-            <p:ph idx="1"/>
-          </p:nvPr>
-        </p:nvSpPr>
-        <p:spPr>
-          <a:xfrm>
-            <a:off x="2699792" y="1600200"/>
-            <a:ext cx="6264696" cy="4565104"/>
-          </a:xfrm>
-        </p:spPr>
-        <p:txBody>
-          <a:bodyPr/>
-          <a:lstStyle/>
-          <a:p>
-            <a:pPr marL="0" indent="0">
-              <a:buNone/>
-            </a:pPr>
-            <a:r>
-              <a:rPr lang="en-US" dirty="0" smtClean="0"/>
-              <a:t>When the </a:t>
-            </a:r>
-            <a:r>
-              <a:rPr lang="en-US" b="1" u="sng" dirty="0" smtClean="0"/>
-              <a:t>Execute()</a:t>
-            </a:r>
-            <a:r>
-              <a:rPr lang="en-US" dirty="0" smtClean="0"/>
-              <a:t> method is called the controller runs and performs the following events:</a:t>
-            </a:r>
-          </a:p>
-          <a:p>
-            <a:r>
-              <a:rPr lang="en-US" b="1" dirty="0" err="1" smtClean="0"/>
-              <a:t>OnLoad</a:t>
-            </a:r>
-            <a:endParaRPr lang="en-US" b="1" dirty="0" smtClean="0"/>
-          </a:p>
-          <a:p>
-            <a:r>
-              <a:rPr lang="en-US" b="1" dirty="0" err="1" smtClean="0"/>
-              <a:t>OnStart</a:t>
-            </a:r>
-            <a:endParaRPr lang="en-US" b="1" dirty="0" smtClean="0"/>
-          </a:p>
-          <a:p>
-            <a:r>
-              <a:rPr lang="en-US" dirty="0" smtClean="0"/>
-              <a:t>Load data and for each row:</a:t>
-            </a:r>
-          </a:p>
-          <a:p>
-            <a:pPr marL="857250" lvl="1" indent="-457200"/>
-            <a:r>
-              <a:rPr lang="en-US" b="1" dirty="0" err="1" smtClean="0"/>
-              <a:t>OnEnterRow</a:t>
-            </a:r>
-            <a:endParaRPr lang="en-US" b="1" dirty="0" smtClean="0"/>
-          </a:p>
-          <a:p>
-            <a:pPr marL="857250" lvl="1" indent="-457200"/>
-            <a:r>
-              <a:rPr lang="en-US" b="1" dirty="0" err="1" smtClean="0"/>
-              <a:t>OnLeaveRow</a:t>
-            </a:r>
-            <a:endParaRPr lang="en-US" b="1" dirty="0" smtClean="0"/>
-          </a:p>
-          <a:p>
-            <a:pPr marL="857250" lvl="1" indent="-457200"/>
-            <a:r>
-              <a:rPr lang="en-US" b="1" dirty="0" err="1" smtClean="0"/>
-              <a:t>OnSavingRow</a:t>
-            </a:r>
-            <a:r>
-              <a:rPr lang="en-US" dirty="0" smtClean="0"/>
-              <a:t> – if the row was changed</a:t>
-            </a:r>
-          </a:p>
-          <a:p>
-            <a:pPr marL="857250" lvl="1" indent="-457200"/>
-            <a:r>
-              <a:rPr lang="en-US" dirty="0" smtClean="0"/>
-              <a:t>Save changes to the database</a:t>
-            </a:r>
-          </a:p>
-          <a:p>
-            <a:r>
-              <a:rPr lang="en-US" b="1" dirty="0" err="1" smtClean="0"/>
-              <a:t>OnEnd</a:t>
-            </a:r>
-            <a:endParaRPr lang="en-US" b="1" dirty="0" smtClean="0"/>
-          </a:p>
-          <a:p>
-            <a:r>
-              <a:rPr lang="en-US" b="1" dirty="0" err="1" smtClean="0"/>
-              <a:t>OnUnLoad</a:t>
-            </a:r>
-            <a:endParaRPr lang="en-US" b="1" dirty="0"/>
-          </a:p>
-          <a:p>
-            <a:pPr>
-              <a:buFont typeface="Arial" panose="020B0604020202020204" pitchFamily="34" charset="0"/>
-              <a:buChar char="•"/>
-            </a:pPr>
-            <a:endParaRPr lang="en-US" dirty="0"/>
-          </a:p>
-          <a:p>
-            <a:pPr marL="0" indent="0">
-              <a:buNone/>
-            </a:pPr>
-            <a:endParaRPr lang="en-US" dirty="0"/>
-          </a:p>
-        </p:txBody>
-      </p:sp>
-      <p:sp>
-        <p:nvSpPr>
           <p:cNvPr id="5" name="Slide Number Placeholder 4"/>
           <p:cNvSpPr>
             <a:spLocks noGrp="1"/>
@@ -5015,7 +4897,7 @@
       </p:sp>
       <p:pic>
         <p:nvPicPr>
-          <p:cNvPr id="8" name="Picture 7"/>
+          <p:cNvPr id="11" name="Picture 10"/>
           <p:cNvPicPr>
             <a:picLocks noChangeAspect="1"/>
           </p:cNvPicPr>
@@ -5029,8 +4911,8 @@
         </p:blipFill>
         <p:spPr>
           <a:xfrm>
-            <a:off x="0" y="1264231"/>
-            <a:ext cx="3765397" cy="335969"/>
+            <a:off x="308877" y="1166401"/>
+            <a:ext cx="4667364" cy="320214"/>
           </a:xfrm>
           <a:prstGeom prst="rect">
             <a:avLst/>
@@ -5041,15 +4923,14 @@
         <p:nvCxnSpPr>
           <p:cNvPr id="9" name="Straight Arrow Connector 8"/>
           <p:cNvCxnSpPr>
-            <a:stCxn id="10" idx="2"/>
-            <a:endCxn id="6" idx="0"/>
+            <a:stCxn id="10" idx="1"/>
           </p:cNvCxnSpPr>
           <p:nvPr/>
         </p:nvCxnSpPr>
         <p:spPr>
           <a:xfrm flipH="1">
-            <a:off x="1238998" y="1604729"/>
-            <a:ext cx="1985482" cy="360930"/>
+            <a:off x="1835696" y="1325389"/>
+            <a:ext cx="2486423" cy="585550"/>
           </a:xfrm>
           <a:prstGeom prst="straightConnector1">
             <a:avLst/>
@@ -5081,8 +4962,8 @@
         </p:nvSpPr>
         <p:spPr>
           <a:xfrm>
-            <a:off x="2807013" y="1268760"/>
-            <a:ext cx="834933" cy="335969"/>
+            <a:off x="4322119" y="1159496"/>
+            <a:ext cx="654122" cy="331786"/>
           </a:xfrm>
           <a:prstGeom prst="roundRect">
             <a:avLst/>
@@ -5147,6 +5028,125 @@
           </a:fontRef>
         </p:style>
       </p:cxnSp>
+      <p:sp>
+        <p:nvSpPr>
+          <p:cNvPr id="3" name="Content Placeholder 2"/>
+          <p:cNvSpPr>
+            <a:spLocks noGrp="1"/>
+          </p:cNvSpPr>
+          <p:nvPr>
+            <p:ph idx="1"/>
+          </p:nvPr>
+        </p:nvSpPr>
+        <p:spPr>
+          <a:xfrm>
+            <a:off x="2699792" y="1600200"/>
+            <a:ext cx="6264696" cy="4565104"/>
+          </a:xfrm>
+        </p:spPr>
+        <p:txBody>
+          <a:bodyPr/>
+          <a:lstStyle/>
+          <a:p>
+            <a:pPr marL="0" indent="0">
+              <a:buNone/>
+            </a:pPr>
+            <a:r>
+              <a:rPr lang="en-US" dirty="0" smtClean="0"/>
+              <a:t>When the </a:t>
+            </a:r>
+            <a:r>
+              <a:rPr lang="en-US" b="1" u="sng" dirty="0" smtClean="0"/>
+              <a:t>Execute()</a:t>
+            </a:r>
+            <a:r>
+              <a:rPr lang="en-US" dirty="0" smtClean="0"/>
+              <a:t> method is called the controller runs and performs the following events:</a:t>
+            </a:r>
+          </a:p>
+          <a:p>
+            <a:r>
+              <a:rPr lang="en-US" b="1" dirty="0" err="1" smtClean="0"/>
+              <a:t>OnLoad</a:t>
+            </a:r>
+            <a:endParaRPr lang="en-US" b="1" dirty="0" smtClean="0"/>
+          </a:p>
+          <a:p>
+            <a:r>
+              <a:rPr lang="en-US" b="1" dirty="0" err="1" smtClean="0"/>
+              <a:t>OnStart</a:t>
+            </a:r>
+            <a:endParaRPr lang="en-US" b="1" dirty="0" smtClean="0"/>
+          </a:p>
+          <a:p>
+            <a:r>
+              <a:rPr lang="en-US" dirty="0" smtClean="0"/>
+              <a:t>Load data and for each row:</a:t>
+            </a:r>
+          </a:p>
+          <a:p>
+            <a:pPr marL="857250" lvl="1" indent="-457200"/>
+            <a:r>
+              <a:rPr lang="en-US" b="1" dirty="0" err="1" smtClean="0"/>
+              <a:t>OnEnterRow</a:t>
+            </a:r>
+            <a:endParaRPr lang="en-US" b="1" dirty="0" smtClean="0"/>
+          </a:p>
+          <a:p>
+            <a:pPr marL="857250" lvl="1" indent="-457200"/>
+            <a:r>
+              <a:rPr lang="en-US" b="1" dirty="0" err="1" smtClean="0"/>
+              <a:t>OnLeaveRow</a:t>
+            </a:r>
+            <a:endParaRPr lang="en-US" b="1" dirty="0" smtClean="0"/>
+          </a:p>
+          <a:p>
+            <a:pPr marL="857250" lvl="1" indent="-457200"/>
+            <a:r>
+              <a:rPr lang="en-US" b="1" dirty="0" err="1" smtClean="0"/>
+              <a:t>OnSavingRow</a:t>
+            </a:r>
+            <a:r>
+              <a:rPr lang="en-US" dirty="0" smtClean="0"/>
+              <a:t> – if the row was changed</a:t>
+            </a:r>
+          </a:p>
+          <a:p>
+            <a:pPr marL="857250" lvl="1" indent="-457200"/>
+            <a:r>
+              <a:rPr lang="en-US" dirty="0" smtClean="0"/>
+              <a:t>Save changes to the database</a:t>
+            </a:r>
+          </a:p>
+          <a:p>
+            <a:r>
+              <a:rPr lang="en-US" b="1" dirty="0" err="1" smtClean="0"/>
+              <a:t>OnEnd</a:t>
+            </a:r>
+            <a:endParaRPr lang="en-US" b="1" dirty="0" smtClean="0"/>
+          </a:p>
+          <a:p>
+            <a:r>
+              <a:rPr lang="en-US" b="1" dirty="0" err="1" smtClean="0"/>
+              <a:t>OnUnLoad</a:t>
+            </a:r>
+            <a:endParaRPr lang="en-US" b="1" dirty="0"/>
+          </a:p>
+          <a:p>
+            <a:pPr>
+              <a:buFont typeface="Arial" panose="020B0604020202020204" pitchFamily="34" charset="0"/>
+              <a:buChar char="•"/>
+            </a:pPr>
+            <a:endParaRPr lang="en-US" dirty="0"/>
+          </a:p>
+          <a:p>
+            <a:pPr marL="0" indent="0">
+              <a:buNone/>
+            </a:pPr>
+            <a:endParaRPr lang="en-US" dirty="0"/>
+          </a:p>
+        </p:txBody>
+      </p:sp>
     </p:spTree>
     <p:extLst>
       <p:ext uri="{BB962C8B-B14F-4D97-AF65-F5344CB8AC3E}">
@@ -5839,8 +5839,8 @@
       </p:par>
     </p:tnLst>
     <p:bldLst>
+      <p:bldP spid="7" grpId="0" animBg="1"/>
       <p:bldP spid="3" grpId="0" build="p"/>
-      <p:bldP spid="7" grpId="0" animBg="1"/>
     </p:bldLst>
   </p:timing>
 </p:sld>

</xml_diff>